<commit_message>
Improve statement of induction principle for N
</commit_message>
<xml_diff>
--- a/20-proofs/lec.pptx
+++ b/20-proofs/lec.pptx
@@ -247,7 +247,7 @@
             <a:fld id="{5367F125-181F-9A48-A24E-AAD89CB055B5}" type="datetimeFigureOut">
               <a:rPr lang="en-US" smtClean="0"/>
               <a:pPr/>
-              <a:t>11/12/19</a:t>
+              <a:t>11/13/19</a:t>
             </a:fld>
             <a:endParaRPr lang="en-US" dirty="0"/>
           </a:p>
@@ -2941,7 +2941,7 @@
           <a:p>
             <a:fld id="{96331252-4874-F047-84B8-3D3EF8743E79}" type="datetimeFigureOut">
               <a:rPr lang="en-US" smtClean="0"/>
-              <a:t>11/12/19</a:t>
+              <a:t>11/13/19</a:t>
             </a:fld>
             <a:endParaRPr lang="en-US"/>
           </a:p>
@@ -3208,7 +3208,7 @@
           <a:p>
             <a:fld id="{96331252-4874-F047-84B8-3D3EF8743E79}" type="datetimeFigureOut">
               <a:rPr lang="en-US" smtClean="0"/>
-              <a:t>11/12/19</a:t>
+              <a:t>11/13/19</a:t>
             </a:fld>
             <a:endParaRPr lang="en-US"/>
           </a:p>
@@ -3386,7 +3386,7 @@
           <a:p>
             <a:fld id="{96331252-4874-F047-84B8-3D3EF8743E79}" type="datetimeFigureOut">
               <a:rPr lang="en-US" smtClean="0"/>
-              <a:t>11/12/19</a:t>
+              <a:t>11/13/19</a:t>
             </a:fld>
             <a:endParaRPr lang="en-US"/>
           </a:p>
@@ -3562,7 +3562,7 @@
           <a:p>
             <a:fld id="{96331252-4874-F047-84B8-3D3EF8743E79}" type="datetimeFigureOut">
               <a:rPr lang="en-US" smtClean="0"/>
-              <a:t>11/12/19</a:t>
+              <a:t>11/13/19</a:t>
             </a:fld>
             <a:endParaRPr lang="en-US"/>
           </a:p>
@@ -3807,7 +3807,7 @@
           <a:p>
             <a:fld id="{96331252-4874-F047-84B8-3D3EF8743E79}" type="datetimeFigureOut">
               <a:rPr lang="en-US" smtClean="0"/>
-              <a:t>11/12/19</a:t>
+              <a:t>11/13/19</a:t>
             </a:fld>
             <a:endParaRPr lang="en-US"/>
           </a:p>
@@ -4092,7 +4092,7 @@
           <a:p>
             <a:fld id="{96331252-4874-F047-84B8-3D3EF8743E79}" type="datetimeFigureOut">
               <a:rPr lang="en-US" smtClean="0"/>
-              <a:t>11/12/19</a:t>
+              <a:t>11/13/19</a:t>
             </a:fld>
             <a:endParaRPr lang="en-US"/>
           </a:p>
@@ -4511,7 +4511,7 @@
           <a:p>
             <a:fld id="{96331252-4874-F047-84B8-3D3EF8743E79}" type="datetimeFigureOut">
               <a:rPr lang="en-US" smtClean="0"/>
-              <a:t>11/12/19</a:t>
+              <a:t>11/13/19</a:t>
             </a:fld>
             <a:endParaRPr lang="en-US"/>
           </a:p>
@@ -4628,7 +4628,7 @@
           <a:p>
             <a:fld id="{96331252-4874-F047-84B8-3D3EF8743E79}" type="datetimeFigureOut">
               <a:rPr lang="en-US" smtClean="0"/>
-              <a:t>11/12/19</a:t>
+              <a:t>11/13/19</a:t>
             </a:fld>
             <a:endParaRPr lang="en-US"/>
           </a:p>
@@ -4723,7 +4723,7 @@
           <a:p>
             <a:fld id="{96331252-4874-F047-84B8-3D3EF8743E79}" type="datetimeFigureOut">
               <a:rPr lang="en-US" smtClean="0"/>
-              <a:t>11/12/19</a:t>
+              <a:t>11/13/19</a:t>
             </a:fld>
             <a:endParaRPr lang="en-US"/>
           </a:p>
@@ -4998,7 +4998,7 @@
           <a:p>
             <a:fld id="{96331252-4874-F047-84B8-3D3EF8743E79}" type="datetimeFigureOut">
               <a:rPr lang="en-US" smtClean="0"/>
-              <a:t>11/12/19</a:t>
+              <a:t>11/13/19</a:t>
             </a:fld>
             <a:endParaRPr lang="en-US"/>
           </a:p>
@@ -5250,7 +5250,7 @@
           <a:p>
             <a:fld id="{96331252-4874-F047-84B8-3D3EF8743E79}" type="datetimeFigureOut">
               <a:rPr lang="en-US" smtClean="0"/>
-              <a:t>11/12/19</a:t>
+              <a:t>11/13/19</a:t>
             </a:fld>
             <a:endParaRPr lang="en-US"/>
           </a:p>
@@ -5464,7 +5464,7 @@
             <a:fld id="{96331252-4874-F047-84B8-3D3EF8743E79}" type="datetimeFigureOut">
               <a:rPr lang="en-US" smtClean="0"/>
               <a:pPr/>
-              <a:t>11/12/19</a:t>
+              <a:t>11/13/19</a:t>
             </a:fld>
             <a:endParaRPr lang="en-US"/>
           </a:p>
@@ -11788,7 +11788,35 @@
                 <a:latin typeface="Cronos Pro" panose="020C0502030403020304" pitchFamily="34" charset="77"/>
                 <a:cs typeface="Courier"/>
               </a:rPr>
-              <a:t> n, P(n) implies P(n+1))</a:t>
+              <a:t> k, P</a:t>
+            </a:r>
+            <a:r>
+              <a:rPr lang="en-US" sz="3600">
+                <a:latin typeface="Cronos Pro" panose="020C0502030403020304" pitchFamily="34" charset="77"/>
+                <a:cs typeface="Courier"/>
+              </a:rPr>
+              <a:t>(k) </a:t>
+            </a:r>
+            <a:r>
+              <a:rPr lang="en-US" sz="3600" dirty="0">
+                <a:latin typeface="Cronos Pro" panose="020C0502030403020304" pitchFamily="34" charset="77"/>
+                <a:cs typeface="Courier"/>
+              </a:rPr>
+              <a:t>implies </a:t>
+            </a:r>
+            <a:r>
+              <a:rPr lang="en-US" sz="3600">
+                <a:latin typeface="Cronos Pro" panose="020C0502030403020304" pitchFamily="34" charset="77"/>
+                <a:cs typeface="Courier"/>
+              </a:rPr>
+              <a:t>P(k+</a:t>
+            </a:r>
+            <a:r>
+              <a:rPr lang="en-US" sz="3600" dirty="0">
+                <a:latin typeface="Cronos Pro" panose="020C0502030403020304" pitchFamily="34" charset="77"/>
+                <a:cs typeface="Courier"/>
+              </a:rPr>
+              <a:t>1))</a:t>
             </a:r>
           </a:p>
           <a:p>

</xml_diff>

<commit_message>
Improve statement of induction principle
</commit_message>
<xml_diff>
--- a/20-proofs/lec.pptx
+++ b/20-proofs/lec.pptx
@@ -11306,14 +11306,24 @@
               <a:t>forall</a:t>
             </a:r>
             <a:r>
-              <a:rPr lang="en-US" dirty="0">
+              <a:rPr lang="en-US">
                 <a:solidFill>
                   <a:srgbClr val="000000"/>
                 </a:solidFill>
                 <a:latin typeface="Cronos Pro" panose="020C0502030403020304" pitchFamily="34" charset="77"/>
                 <a:cs typeface="Courier"/>
               </a:rPr>
-              <a:t> natural numbers n, P(n).</a:t>
+              <a:t> n</a:t>
+            </a:r>
+            <a:r>
+              <a:rPr lang="en-US" dirty="0">
+                <a:solidFill>
+                  <a:srgbClr val="000000"/>
+                </a:solidFill>
+                <a:latin typeface="Cronos Pro" panose="020C0502030403020304" pitchFamily="34" charset="77"/>
+                <a:cs typeface="Courier"/>
+              </a:rPr>
+              <a:t>, P(n).</a:t>
             </a:r>
           </a:p>
           <a:p>

</xml_diff>